<commit_message>
añadir al modelo bar imagenes
</commit_message>
<xml_diff>
--- a/Documentacion/documentacionAPI.pptx
+++ b/Documentacion/documentacionAPI.pptx
@@ -3194,10 +3194,10 @@
               <a:t>json</a:t>
             </a:r>
             <a:r>
-              <a:rPr lang="es-ES" sz="1400" smtClean="0"/>
+              <a:rPr lang="es-ES" sz="1400" dirty="0" smtClean="0"/>
               <a:t>}</a:t>
             </a:r>
-            <a:endParaRPr lang="es-ES" sz="1400"/>
+            <a:endParaRPr lang="es-ES" sz="1400" dirty="0"/>
           </a:p>
           <a:p>
             <a:pPr marL="800100" lvl="1" indent="-342900" algn="l">

</xml_diff>